<commit_message>
Update presentation; add pre-check code (image processing)
</commit_message>
<xml_diff>
--- a/image_processing/Python Workshop - Image Processing.pptx
+++ b/image_processing/Python Workshop - Image Processing.pptx
@@ -1,11 +1,11 @@
 
 <file path=ppt/presentation.xml><?xml version="1.0" encoding="utf-8"?>
-<p:presentation xmlns:a="http://schemas.openxmlformats.org/drawingml/2006/main" xmlns:r="http://schemas.openxmlformats.org/officeDocument/2006/relationships" xmlns:p="http://schemas.openxmlformats.org/presentationml/2006/main" saveSubsetFonts="1">
+<p:presentation xmlns:a="http://schemas.openxmlformats.org/drawingml/2006/main" xmlns:r="http://schemas.openxmlformats.org/officeDocument/2006/relationships" xmlns:p="http://schemas.openxmlformats.org/presentationml/2006/main" removePersonalInfoOnSave="1" saveSubsetFonts="1">
   <p:sldMasterIdLst>
     <p:sldMasterId id="2147483648" r:id="rId1"/>
   </p:sldMasterIdLst>
   <p:sldIdLst>
-    <p:sldId id="256" r:id="rId2"/>
+    <p:sldId id="270" r:id="rId2"/>
     <p:sldId id="257" r:id="rId3"/>
     <p:sldId id="259" r:id="rId4"/>
     <p:sldId id="258" r:id="rId5"/>
@@ -248,7 +248,7 @@
           <a:p>
             <a:fld id="{DB2D40D2-DA59-418F-9676-2E287E608FAF}" type="datetimeFigureOut">
               <a:rPr lang="de-CH" smtClean="0"/>
-              <a:t>05.09.2019</a:t>
+              <a:t>07.11.2020</a:t>
             </a:fld>
             <a:endParaRPr lang="de-CH"/>
           </a:p>
@@ -418,7 +418,7 @@
           <a:p>
             <a:fld id="{DB2D40D2-DA59-418F-9676-2E287E608FAF}" type="datetimeFigureOut">
               <a:rPr lang="de-CH" smtClean="0"/>
-              <a:t>05.09.2019</a:t>
+              <a:t>07.11.2020</a:t>
             </a:fld>
             <a:endParaRPr lang="de-CH"/>
           </a:p>
@@ -598,7 +598,7 @@
           <a:p>
             <a:fld id="{DB2D40D2-DA59-418F-9676-2E287E608FAF}" type="datetimeFigureOut">
               <a:rPr lang="de-CH" smtClean="0"/>
-              <a:t>05.09.2019</a:t>
+              <a:t>07.11.2020</a:t>
             </a:fld>
             <a:endParaRPr lang="de-CH"/>
           </a:p>
@@ -768,7 +768,7 @@
           <a:p>
             <a:fld id="{DB2D40D2-DA59-418F-9676-2E287E608FAF}" type="datetimeFigureOut">
               <a:rPr lang="de-CH" smtClean="0"/>
-              <a:t>05.09.2019</a:t>
+              <a:t>07.11.2020</a:t>
             </a:fld>
             <a:endParaRPr lang="de-CH"/>
           </a:p>
@@ -1014,7 +1014,7 @@
           <a:p>
             <a:fld id="{DB2D40D2-DA59-418F-9676-2E287E608FAF}" type="datetimeFigureOut">
               <a:rPr lang="de-CH" smtClean="0"/>
-              <a:t>05.09.2019</a:t>
+              <a:t>07.11.2020</a:t>
             </a:fld>
             <a:endParaRPr lang="de-CH"/>
           </a:p>
@@ -1246,7 +1246,7 @@
           <a:p>
             <a:fld id="{DB2D40D2-DA59-418F-9676-2E287E608FAF}" type="datetimeFigureOut">
               <a:rPr lang="de-CH" smtClean="0"/>
-              <a:t>05.09.2019</a:t>
+              <a:t>07.11.2020</a:t>
             </a:fld>
             <a:endParaRPr lang="de-CH"/>
           </a:p>
@@ -1613,7 +1613,7 @@
           <a:p>
             <a:fld id="{DB2D40D2-DA59-418F-9676-2E287E608FAF}" type="datetimeFigureOut">
               <a:rPr lang="de-CH" smtClean="0"/>
-              <a:t>05.09.2019</a:t>
+              <a:t>07.11.2020</a:t>
             </a:fld>
             <a:endParaRPr lang="de-CH"/>
           </a:p>
@@ -1731,7 +1731,7 @@
           <a:p>
             <a:fld id="{DB2D40D2-DA59-418F-9676-2E287E608FAF}" type="datetimeFigureOut">
               <a:rPr lang="de-CH" smtClean="0"/>
-              <a:t>05.09.2019</a:t>
+              <a:t>07.11.2020</a:t>
             </a:fld>
             <a:endParaRPr lang="de-CH"/>
           </a:p>
@@ -1826,7 +1826,7 @@
           <a:p>
             <a:fld id="{DB2D40D2-DA59-418F-9676-2E287E608FAF}" type="datetimeFigureOut">
               <a:rPr lang="de-CH" smtClean="0"/>
-              <a:t>05.09.2019</a:t>
+              <a:t>07.11.2020</a:t>
             </a:fld>
             <a:endParaRPr lang="de-CH"/>
           </a:p>
@@ -2103,7 +2103,7 @@
           <a:p>
             <a:fld id="{DB2D40D2-DA59-418F-9676-2E287E608FAF}" type="datetimeFigureOut">
               <a:rPr lang="de-CH" smtClean="0"/>
-              <a:t>05.09.2019</a:t>
+              <a:t>07.11.2020</a:t>
             </a:fld>
             <a:endParaRPr lang="de-CH"/>
           </a:p>
@@ -2356,7 +2356,7 @@
           <a:p>
             <a:fld id="{DB2D40D2-DA59-418F-9676-2E287E608FAF}" type="datetimeFigureOut">
               <a:rPr lang="de-CH" smtClean="0"/>
-              <a:t>05.09.2019</a:t>
+              <a:t>07.11.2020</a:t>
             </a:fld>
             <a:endParaRPr lang="de-CH"/>
           </a:p>
@@ -2569,7 +2569,7 @@
           <a:p>
             <a:fld id="{DB2D40D2-DA59-418F-9676-2E287E608FAF}" type="datetimeFigureOut">
               <a:rPr lang="de-CH" smtClean="0"/>
-              <a:t>05.09.2019</a:t>
+              <a:t>07.11.2020</a:t>
             </a:fld>
             <a:endParaRPr lang="de-CH"/>
           </a:p>
@@ -2986,8 +2986,8 @@
         </p:nvSpPr>
         <p:spPr>
           <a:xfrm>
-            <a:off x="1524000" y="3607900"/>
-            <a:ext cx="9144000" cy="1655762"/>
+            <a:off x="1523997" y="2995399"/>
+            <a:ext cx="9144000" cy="2461006"/>
           </a:xfrm>
         </p:spPr>
         <p:txBody>
@@ -2997,10 +2997,27 @@
           <a:lstStyle/>
           <a:p>
             <a:r>
-              <a:rPr lang="en-US" sz="2800" dirty="0"/>
-              <a:t>FAIM Python Workshop III – Image Processing</a:t>
-            </a:r>
-            <a:endParaRPr lang="de-CH" sz="2800" dirty="0"/>
+              <a:rPr lang="en-US" sz="3200" dirty="0"/>
+              <a:t>FAIM Python Course – Session 3</a:t>
+            </a:r>
+          </a:p>
+          <a:p>
+            <a:r>
+              <a:rPr lang="en-US" sz="3200" dirty="0"/>
+              <a:t>Image Processing</a:t>
+            </a:r>
+          </a:p>
+          <a:p>
+            <a:endParaRPr lang="en-US" sz="2600" dirty="0"/>
+          </a:p>
+          <a:p>
+            <a:r>
+              <a:rPr lang="de-CH" dirty="0">
+                <a:hlinkClick r:id="rId2"/>
+              </a:rPr>
+              <a:t>benjamin.titze@fmi.ch</a:t>
+            </a:r>
+            <a:endParaRPr lang="de-CH" dirty="0"/>
           </a:p>
         </p:txBody>
       </p:sp>
@@ -3013,7 +3030,7 @@
           <p:nvPr/>
         </p:nvPicPr>
         <p:blipFill>
-          <a:blip r:embed="rId2">
+          <a:blip r:embed="rId3">
             <a:extLst>
               <a:ext uri="{28A0092B-C50C-407E-A947-70E740481C1C}">
                 <a14:useLocalDpi xmlns:a14="http://schemas.microsoft.com/office/drawing/2010/main" val="0"/>
@@ -3026,8 +3043,8 @@
         </p:blipFill>
         <p:spPr>
           <a:xfrm>
-            <a:off x="3830573" y="1972005"/>
-            <a:ext cx="4530854" cy="1530388"/>
+            <a:off x="3998084" y="1578173"/>
+            <a:ext cx="4195827" cy="1417226"/>
           </a:xfrm>
           <a:prstGeom prst="rect">
             <a:avLst/>
@@ -3042,8 +3059,8 @@
         </p:nvSpPr>
         <p:spPr>
           <a:xfrm>
-            <a:off x="7527851" y="6394939"/>
-            <a:ext cx="4546919" cy="369332"/>
+            <a:off x="10348686" y="6455899"/>
+            <a:ext cx="1773014" cy="338554"/>
           </a:xfrm>
           <a:prstGeom prst="rect">
             <a:avLst/>
@@ -3058,16 +3075,16 @@
           <a:p>
             <a:pPr algn="r"/>
             <a:r>
-              <a:rPr lang="en-US" dirty="0">
+              <a:rPr lang="en-US" sz="1600" dirty="0">
                 <a:solidFill>
                   <a:schemeClr val="bg1">
                     <a:lumMod val="65000"/>
                   </a:schemeClr>
                 </a:solidFill>
               </a:rPr>
-              <a:t>4 September 2019 | benjamin.titze@fmi.ch</a:t>
-            </a:r>
-            <a:endParaRPr lang="de-CH" dirty="0">
+              <a:t>5 November 2020</a:t>
+            </a:r>
+            <a:endParaRPr lang="de-CH" sz="1600" dirty="0">
               <a:solidFill>
                 <a:schemeClr val="bg1">
                   <a:lumMod val="65000"/>
@@ -3077,23 +3094,64 @@
           </a:p>
         </p:txBody>
       </p:sp>
+      <p:sp>
+        <p:nvSpPr>
+          <p:cNvPr id="10" name="TextBox 9">
+            <a:extLst>
+              <a:ext uri="{FF2B5EF4-FFF2-40B4-BE49-F238E27FC236}">
+                <a16:creationId xmlns:a16="http://schemas.microsoft.com/office/drawing/2014/main" id="{2165A71C-5DF7-4DBA-A4E6-049AD129B4A1}"/>
+              </a:ext>
+            </a:extLst>
+          </p:cNvPr>
+          <p:cNvSpPr txBox="1"/>
+          <p:nvPr/>
+        </p:nvSpPr>
+        <p:spPr>
+          <a:xfrm>
+            <a:off x="70300" y="6455899"/>
+            <a:ext cx="6096000" cy="338554"/>
+          </a:xfrm>
+          <a:prstGeom prst="rect">
+            <a:avLst/>
+          </a:prstGeom>
+          <a:noFill/>
+        </p:spPr>
+        <p:txBody>
+          <a:bodyPr wrap="square">
+            <a:spAutoFit/>
+          </a:bodyPr>
+          <a:lstStyle/>
+          <a:p>
+            <a:r>
+              <a:rPr lang="en-US" sz="1600" dirty="0">
+                <a:solidFill>
+                  <a:schemeClr val="bg1">
+                    <a:lumMod val="65000"/>
+                  </a:schemeClr>
+                </a:solidFill>
+              </a:rPr>
+              <a:t>Facility for Advanced Imaging and Microscopy (FAIM)</a:t>
+            </a:r>
+            <a:endParaRPr lang="de-CH" sz="1600" dirty="0">
+              <a:solidFill>
+                <a:schemeClr val="bg1">
+                  <a:lumMod val="65000"/>
+                </a:schemeClr>
+              </a:solidFill>
+            </a:endParaRPr>
+          </a:p>
+        </p:txBody>
+      </p:sp>
     </p:spTree>
     <p:extLst>
       <p:ext uri="{BB962C8B-B14F-4D97-AF65-F5344CB8AC3E}">
-        <p14:creationId xmlns:p14="http://schemas.microsoft.com/office/powerpoint/2010/main" val="664846721"/>
+        <p14:creationId xmlns:p14="http://schemas.microsoft.com/office/powerpoint/2010/main" val="4226861242"/>
       </p:ext>
     </p:extLst>
   </p:cSld>
   <p:clrMapOvr>
     <a:masterClrMapping/>
   </p:clrMapOvr>
-  <p:timing>
-    <p:tnLst>
-      <p:par>
-        <p:cTn id="1" dur="indefinite" restart="never" nodeType="tmRoot"/>
-      </p:par>
-    </p:tnLst>
-  </p:timing>
 </p:sld>
 </file>
 
@@ -3173,28 +3231,20 @@
             </a:r>
             <a:r>
               <a:rPr lang="en-US" dirty="0"/>
-              <a:t> Notebook. </a:t>
+              <a:t> Notebook</a:t>
             </a:r>
           </a:p>
           <a:p>
             <a:pPr lvl="1"/>
             <a:r>
               <a:rPr lang="en-US" dirty="0"/>
-              <a:t>Libraries: Pillow (PIL) and </a:t>
-            </a:r>
-            <a:r>
-              <a:rPr lang="en-US" dirty="0" err="1"/>
-              <a:t>scikit</a:t>
-            </a:r>
+              <a:t>Libraries: pillow (PIL), scikit-image, NumPy, SciPy, Matplotlib</a:t>
+            </a:r>
+          </a:p>
+          <a:p>
             <a:r>
               <a:rPr lang="en-US" dirty="0"/>
-              <a:t>-image; NumPy, SciPy, matplotlib</a:t>
-            </a:r>
-          </a:p>
-          <a:p>
-            <a:r>
-              <a:rPr lang="en-US" dirty="0"/>
-              <a:t>Digital image processing</a:t>
+              <a:t>Overview: Digital image processing</a:t>
             </a:r>
           </a:p>
           <a:p>
@@ -3235,7 +3285,7 @@
             <a:pPr lvl="1"/>
             <a:r>
               <a:rPr lang="en-US" dirty="0"/>
-              <a:t>Applying filters</a:t>
+              <a:t>Applying filters/thresholds</a:t>
             </a:r>
           </a:p>
           <a:p>
@@ -3692,23 +3742,7 @@
           <a:p>
             <a:r>
               <a:rPr lang="en-US" dirty="0"/>
-              <a:t>Every pixel has a coordinate (</a:t>
-            </a:r>
-            <a:r>
-              <a:rPr lang="en-US" dirty="0" smtClean="0"/>
-              <a:t>x/y = </a:t>
-            </a:r>
-            <a:r>
-              <a:rPr lang="en-US" dirty="0"/>
-              <a:t>column </a:t>
-            </a:r>
-            <a:r>
-              <a:rPr lang="en-US" dirty="0" smtClean="0"/>
-              <a:t>position/row </a:t>
-            </a:r>
-            <a:r>
-              <a:rPr lang="en-US" dirty="0"/>
-              <a:t>position starting from 0/0 in upper left corner) </a:t>
+              <a:t>Every pixel has a coordinate (x/y = column position/row position starting from 0/0 in upper left corner) </a:t>
             </a:r>
           </a:p>
           <a:p>
@@ -3734,14 +3768,14 @@
           <p:nvPr/>
         </p:nvPicPr>
         <p:blipFill rotWithShape="1">
-          <a:blip r:embed="rId3">
+          <a:blip r:embed="rId3" cstate="print">
             <a:extLst>
               <a:ext uri="{28A0092B-C50C-407E-A947-70E740481C1C}">
                 <a14:useLocalDpi xmlns:a14="http://schemas.microsoft.com/office/drawing/2010/main" val="0"/>
               </a:ext>
             </a:extLst>
           </a:blip>
-          <a:srcRect l="2925" t="2024" r="2608" b="622"/>
+          <a:srcRect/>
           <a:stretch/>
         </p:blipFill>
         <p:spPr>
@@ -3799,13 +3833,6 @@
   <p:clrMapOvr>
     <a:masterClrMapping/>
   </p:clrMapOvr>
-  <p:timing>
-    <p:tnLst>
-      <p:par>
-        <p:cTn id="1" dur="indefinite" restart="never" nodeType="tmRoot"/>
-      </p:par>
-    </p:tnLst>
-  </p:timing>
 </p:sld>
 </file>
 
@@ -3842,13 +3869,20 @@
             <p:ph type="title"/>
           </p:nvPr>
         </p:nvSpPr>
-        <p:spPr/>
-        <p:txBody>
-          <a:bodyPr/>
-          <a:lstStyle/>
-          <a:p>
-            <a:r>
-              <a:rPr lang="en-US" dirty="0"/>
+        <p:spPr>
+          <a:xfrm>
+            <a:off x="465338" y="338493"/>
+            <a:ext cx="10515600" cy="957648"/>
+          </a:xfrm>
+        </p:spPr>
+        <p:txBody>
+          <a:bodyPr>
+            <a:normAutofit/>
+          </a:bodyPr>
+          <a:lstStyle/>
+          <a:p>
+            <a:r>
+              <a:rPr lang="en-US" sz="3600" dirty="0"/>
               <a:t>(Bio)Image Processing/Analysis</a:t>
             </a:r>
           </a:p>
@@ -3870,62 +3904,77 @@
             <p:ph idx="1"/>
           </p:nvPr>
         </p:nvSpPr>
-        <p:spPr/>
+        <p:spPr>
+          <a:xfrm>
+            <a:off x="971364" y="1624614"/>
+            <a:ext cx="9930414" cy="4492101"/>
+          </a:xfrm>
+        </p:spPr>
         <p:txBody>
           <a:bodyPr>
-            <a:normAutofit/>
+            <a:noAutofit/>
           </a:bodyPr>
           <a:lstStyle/>
           <a:p>
-            <a:r>
-              <a:rPr lang="en-US" dirty="0"/>
-              <a:t>Loading images into memory for processing, saving (processed) image data from memory to disk, converting between formats and bit-depths (tiff, </a:t>
-            </a:r>
-            <a:r>
-              <a:rPr lang="en-US" dirty="0" err="1"/>
+            <a:pPr marL="0" indent="0">
+              <a:buNone/>
+            </a:pPr>
+            <a:r>
+              <a:rPr lang="en-US" sz="2400" dirty="0"/>
+              <a:t>Common tasks:</a:t>
+            </a:r>
+          </a:p>
+          <a:p>
+            <a:r>
+              <a:rPr lang="en-US" sz="2000" dirty="0"/>
+              <a:t>I/O: Loading images into memory for processing, saving (processed) image data from memory to disk, converting between formats and bit-depths (tiff, </a:t>
+            </a:r>
+            <a:r>
+              <a:rPr lang="en-US" sz="2000" dirty="0" err="1"/>
               <a:t>png</a:t>
             </a:r>
             <a:r>
-              <a:rPr lang="en-US" dirty="0"/>
-              <a:t>, jpg…; 8-bit, 16-bit…)</a:t>
-            </a:r>
-          </a:p>
-          <a:p>
-            <a:r>
-              <a:rPr lang="en-US" dirty="0"/>
-              <a:t>Image manipulation:</a:t>
-            </a:r>
-          </a:p>
-          <a:p>
-            <a:pPr lvl="1"/>
-            <a:r>
-              <a:rPr lang="en-US" dirty="0"/>
-              <a:t>Shape: Cropping, resizing, rotation, flipping, …</a:t>
-            </a:r>
-          </a:p>
-          <a:p>
-            <a:pPr lvl="1"/>
-            <a:r>
-              <a:rPr lang="en-US" dirty="0"/>
-              <a:t>Brightness, contrast…</a:t>
-            </a:r>
-          </a:p>
-          <a:p>
-            <a:r>
-              <a:rPr lang="en-US" dirty="0"/>
-              <a:t>Image statistics: mean, standard deviation, histogram…</a:t>
-            </a:r>
-          </a:p>
-          <a:p>
-            <a:r>
-              <a:rPr lang="en-US" dirty="0"/>
-              <a:t>Applying filters: denoising, edge detection…</a:t>
-            </a:r>
-          </a:p>
-          <a:p>
-            <a:r>
-              <a:rPr lang="en-US" dirty="0"/>
-              <a:t>Extraction of relevant information: spot detection, segmentation… </a:t>
+              <a:rPr lang="en-US" sz="2000" dirty="0"/>
+              <a:t>, jpg…; 8 bit, 16 bit…)</a:t>
+            </a:r>
+          </a:p>
+          <a:p>
+            <a:r>
+              <a:rPr lang="en-US" sz="2000" dirty="0"/>
+              <a:t>Image manipulation: Brightness &amp; contrast; Cropping, resizing, rotation, flipping, …</a:t>
+            </a:r>
+          </a:p>
+          <a:p>
+            <a:r>
+              <a:rPr lang="en-US" sz="2000" dirty="0"/>
+              <a:t>Image statistics: Mean, standard deviation, histogram…</a:t>
+            </a:r>
+          </a:p>
+          <a:p>
+            <a:r>
+              <a:rPr lang="en-US" sz="2000" dirty="0"/>
+              <a:t>Applying filters: Denoising, edge detection…</a:t>
+            </a:r>
+          </a:p>
+          <a:p>
+            <a:r>
+              <a:rPr lang="en-US" sz="2000" dirty="0"/>
+              <a:t>Extraction of relevant information: Spot detection, segmentation… </a:t>
+            </a:r>
+          </a:p>
+          <a:p>
+            <a:pPr marL="0" indent="0">
+              <a:buNone/>
+            </a:pPr>
+            <a:endParaRPr lang="en-US" sz="2400" dirty="0"/>
+          </a:p>
+          <a:p>
+            <a:pPr marL="0" indent="0">
+              <a:buNone/>
+            </a:pPr>
+            <a:r>
+              <a:rPr lang="en-US" sz="2400" dirty="0"/>
+              <a:t>Please note that this session is not aimed at teaching fundamental image processing concepts (see Jan’s introductory courses for that), but at giving you an overview how Python can be used for image processing.</a:t>
             </a:r>
           </a:p>
         </p:txBody>
@@ -3976,7 +4025,7 @@
                                         <p:tgtEl>
                                           <p:spTgt spid="3">
                                             <p:txEl>
-                                              <p:pRg st="0" end="0"/>
+                                              <p:pRg st="1" end="1"/>
                                             </p:txEl>
                                           </p:spTgt>
                                         </p:tgtEl>
@@ -4025,37 +4074,6 @@
                                         <p:tgtEl>
                                           <p:spTgt spid="3">
                                             <p:txEl>
-                                              <p:pRg st="1" end="1"/>
-                                            </p:txEl>
-                                          </p:spTgt>
-                                        </p:tgtEl>
-                                        <p:attrNameLst>
-                                          <p:attrName>style.visibility</p:attrName>
-                                        </p:attrNameLst>
-                                      </p:cBhvr>
-                                      <p:to>
-                                        <p:strVal val="visible"/>
-                                      </p:to>
-                                    </p:set>
-                                  </p:childTnLst>
-                                </p:cTn>
-                              </p:par>
-                              <p:par>
-                                <p:cTn id="11" presetID="1" presetClass="entr" presetSubtype="0" fill="hold" nodeType="withEffect">
-                                  <p:stCondLst>
-                                    <p:cond delay="0"/>
-                                  </p:stCondLst>
-                                  <p:childTnLst>
-                                    <p:set>
-                                      <p:cBhvr>
-                                        <p:cTn id="12" dur="1" fill="hold">
-                                          <p:stCondLst>
-                                            <p:cond delay="0"/>
-                                          </p:stCondLst>
-                                        </p:cTn>
-                                        <p:tgtEl>
-                                          <p:spTgt spid="3">
-                                            <p:txEl>
                                               <p:pRg st="2" end="2"/>
                                             </p:txEl>
                                           </p:spTgt>
@@ -4071,8 +4089,26 @@
                                   </p:childTnLst>
                                 </p:cTn>
                               </p:par>
+                            </p:childTnLst>
+                          </p:cTn>
+                        </p:par>
+                      </p:childTnLst>
+                    </p:cTn>
+                  </p:par>
+                  <p:par>
+                    <p:cTn id="11" fill="hold">
+                      <p:stCondLst>
+                        <p:cond delay="indefinite"/>
+                      </p:stCondLst>
+                      <p:childTnLst>
+                        <p:par>
+                          <p:cTn id="12" fill="hold">
+                            <p:stCondLst>
+                              <p:cond delay="0"/>
+                            </p:stCondLst>
+                            <p:childTnLst>
                               <p:par>
-                                <p:cTn id="13" presetID="1" presetClass="entr" presetSubtype="0" fill="hold" nodeType="withEffect">
+                                <p:cTn id="13" presetID="1" presetClass="entr" presetSubtype="0" fill="hold" nodeType="clickEffect">
                                   <p:stCondLst>
                                     <p:cond delay="0"/>
                                   </p:stCondLst>
@@ -4234,7 +4270,7 @@
                                         <p:tgtEl>
                                           <p:spTgt spid="3">
                                             <p:txEl>
-                                              <p:pRg st="6" end="6"/>
+                                              <p:pRg st="7" end="7"/>
                                             </p:txEl>
                                           </p:spTgt>
                                         </p:tgtEl>
@@ -4299,205 +4335,6 @@
       </p:grpSpPr>
       <p:pic>
         <p:nvPicPr>
-          <p:cNvPr id="4" name="Content Placeholder 5">
-            <a:extLst>
-              <a:ext uri="{FF2B5EF4-FFF2-40B4-BE49-F238E27FC236}">
-                <a16:creationId xmlns:a16="http://schemas.microsoft.com/office/drawing/2014/main" id="{2887BAB1-7C5A-4E46-AAEA-FC1B92623CD6}"/>
-              </a:ext>
-            </a:extLst>
-          </p:cNvPr>
-          <p:cNvPicPr>
-            <a:picLocks noGrp="1" noChangeAspect="1"/>
-          </p:cNvPicPr>
-          <p:nvPr>
-            <p:ph idx="1"/>
-          </p:nvPr>
-        </p:nvPicPr>
-        <p:blipFill>
-          <a:blip r:embed="rId2" cstate="print">
-            <a:extLst>
-              <a:ext uri="{28A0092B-C50C-407E-A947-70E740481C1C}">
-                <a14:useLocalDpi xmlns:a14="http://schemas.microsoft.com/office/drawing/2010/main" val="0"/>
-              </a:ext>
-            </a:extLst>
-          </a:blip>
-          <a:stretch>
-            <a:fillRect/>
-          </a:stretch>
-        </p:blipFill>
-        <p:spPr>
-          <a:xfrm>
-            <a:off x="571574" y="497710"/>
-            <a:ext cx="2538047" cy="1001100"/>
-          </a:xfrm>
-        </p:spPr>
-      </p:pic>
-      <p:sp>
-        <p:nvSpPr>
-          <p:cNvPr id="5" name="TextBox 4">
-            <a:extLst>
-              <a:ext uri="{FF2B5EF4-FFF2-40B4-BE49-F238E27FC236}">
-                <a16:creationId xmlns:a16="http://schemas.microsoft.com/office/drawing/2014/main" id="{1D83CA8F-E530-47D7-9F64-B12D998E4EBE}"/>
-              </a:ext>
-            </a:extLst>
-          </p:cNvPr>
-          <p:cNvSpPr txBox="1"/>
-          <p:nvPr/>
-        </p:nvSpPr>
-        <p:spPr>
-          <a:xfrm>
-            <a:off x="571575" y="1673758"/>
-            <a:ext cx="2972612" cy="1600438"/>
-          </a:xfrm>
-          <a:prstGeom prst="rect">
-            <a:avLst/>
-          </a:prstGeom>
-          <a:noFill/>
-        </p:spPr>
-        <p:txBody>
-          <a:bodyPr wrap="square" rtlCol="0">
-            <a:spAutoFit/>
-          </a:bodyPr>
-          <a:lstStyle/>
-          <a:p>
-            <a:r>
-              <a:rPr lang="en-US" sz="1400" dirty="0"/>
-              <a:t>(pronounced </a:t>
-            </a:r>
-            <a:r>
-              <a:rPr lang="en-US" sz="1400" i="1" dirty="0" err="1"/>
-              <a:t>Num</a:t>
-            </a:r>
-            <a:r>
-              <a:rPr lang="en-US" sz="1400" i="1" dirty="0"/>
-              <a:t> Pie</a:t>
-            </a:r>
-            <a:r>
-              <a:rPr lang="en-US" sz="1400" dirty="0"/>
-              <a:t>) </a:t>
-            </a:r>
-          </a:p>
-          <a:p>
-            <a:r>
-              <a:rPr lang="en-US" sz="1400" dirty="0"/>
-              <a:t>A library for fast manipulation of multidimensional numerical data. The basic type </a:t>
-            </a:r>
-            <a:r>
-              <a:rPr lang="en-US" sz="1400" i="1" dirty="0" err="1"/>
-              <a:t>ndarray</a:t>
-            </a:r>
-            <a:r>
-              <a:rPr lang="en-US" sz="1400" dirty="0"/>
-              <a:t> is a multidimensional array with zero-based indexing</a:t>
-            </a:r>
-            <a:endParaRPr lang="de-CH" sz="1400" dirty="0"/>
-          </a:p>
-          <a:p>
-            <a:endParaRPr lang="en-US" sz="1400" dirty="0"/>
-          </a:p>
-        </p:txBody>
-      </p:sp>
-      <p:pic>
-        <p:nvPicPr>
-          <p:cNvPr id="6" name="Picture 5">
-            <a:extLst>
-              <a:ext uri="{FF2B5EF4-FFF2-40B4-BE49-F238E27FC236}">
-                <a16:creationId xmlns:a16="http://schemas.microsoft.com/office/drawing/2014/main" id="{6BEF6802-33D6-440F-8D71-988E1E2E8B44}"/>
-              </a:ext>
-            </a:extLst>
-          </p:cNvPr>
-          <p:cNvPicPr>
-            <a:picLocks noChangeAspect="1"/>
-          </p:cNvPicPr>
-          <p:nvPr/>
-        </p:nvPicPr>
-        <p:blipFill>
-          <a:blip r:embed="rId3" cstate="print">
-            <a:extLst>
-              <a:ext uri="{28A0092B-C50C-407E-A947-70E740481C1C}">
-                <a14:useLocalDpi xmlns:a14="http://schemas.microsoft.com/office/drawing/2010/main" val="0"/>
-              </a:ext>
-            </a:extLst>
-          </a:blip>
-          <a:stretch>
-            <a:fillRect/>
-          </a:stretch>
-        </p:blipFill>
-        <p:spPr>
-          <a:xfrm>
-            <a:off x="4182013" y="497710"/>
-            <a:ext cx="2215662" cy="880330"/>
-          </a:xfrm>
-          <a:prstGeom prst="rect">
-            <a:avLst/>
-          </a:prstGeom>
-        </p:spPr>
-      </p:pic>
-      <p:sp>
-        <p:nvSpPr>
-          <p:cNvPr id="7" name="TextBox 6">
-            <a:extLst>
-              <a:ext uri="{FF2B5EF4-FFF2-40B4-BE49-F238E27FC236}">
-                <a16:creationId xmlns:a16="http://schemas.microsoft.com/office/drawing/2014/main" id="{8DB05BC6-B1C3-4EBC-A085-C62A7DA0B903}"/>
-              </a:ext>
-            </a:extLst>
-          </p:cNvPr>
-          <p:cNvSpPr txBox="1"/>
-          <p:nvPr/>
-        </p:nvSpPr>
-        <p:spPr>
-          <a:xfrm>
-            <a:off x="4047335" y="1612441"/>
-            <a:ext cx="3367104" cy="1600438"/>
-          </a:xfrm>
-          <a:prstGeom prst="rect">
-            <a:avLst/>
-          </a:prstGeom>
-          <a:noFill/>
-        </p:spPr>
-        <p:txBody>
-          <a:bodyPr wrap="square" rtlCol="0">
-            <a:spAutoFit/>
-          </a:bodyPr>
-          <a:lstStyle/>
-          <a:p>
-            <a:r>
-              <a:rPr lang="en-US" sz="1400" dirty="0"/>
-              <a:t>(pronounced </a:t>
-            </a:r>
-            <a:r>
-              <a:rPr lang="en-US" sz="1400" i="1" dirty="0"/>
-              <a:t>Sigh Pie</a:t>
-            </a:r>
-            <a:r>
-              <a:rPr lang="en-US" sz="1400" dirty="0"/>
-              <a:t>) </a:t>
-            </a:r>
-          </a:p>
-          <a:p>
-            <a:r>
-              <a:rPr lang="en-US" sz="1400" dirty="0"/>
-              <a:t>A scientific computing library with various modules for numerical integration, linear algebra, image processing, Fourier transforms, signal processing, statistical functions…</a:t>
-            </a:r>
-          </a:p>
-          <a:p>
-            <a:r>
-              <a:rPr lang="en-US" sz="1400" dirty="0"/>
-              <a:t>Builds upon </a:t>
-            </a:r>
-            <a:r>
-              <a:rPr lang="en-US" sz="1400" dirty="0" err="1"/>
-              <a:t>numpy</a:t>
-            </a:r>
-            <a:r>
-              <a:rPr lang="en-US" sz="1400" dirty="0"/>
-              <a:t> arrays.</a:t>
-            </a:r>
-          </a:p>
-        </p:txBody>
-      </p:sp>
-      <p:pic>
-        <p:nvPicPr>
           <p:cNvPr id="13" name="Picture 12" descr="A close up of a logo&#10;&#10;Description automatically generated">
             <a:extLst>
               <a:ext uri="{FF2B5EF4-FFF2-40B4-BE49-F238E27FC236}">
@@ -4511,7 +4348,7 @@
           <p:nvPr/>
         </p:nvPicPr>
         <p:blipFill>
-          <a:blip r:embed="rId4">
+          <a:blip r:embed="rId3">
             <a:extLst>
               <a:ext uri="{28A0092B-C50C-407E-A947-70E740481C1C}">
                 <a14:useLocalDpi xmlns:a14="http://schemas.microsoft.com/office/drawing/2010/main" val="0"/>
@@ -4524,8 +4361,8 @@
         </p:blipFill>
         <p:spPr>
           <a:xfrm>
-            <a:off x="7898079" y="497710"/>
-            <a:ext cx="3471543" cy="855662"/>
+            <a:off x="7916464" y="728961"/>
+            <a:ext cx="3666034" cy="903600"/>
           </a:xfrm>
           <a:prstGeom prst="rect">
             <a:avLst/>
@@ -4546,8 +4383,8 @@
         </p:nvSpPr>
         <p:spPr>
           <a:xfrm>
-            <a:off x="7898079" y="1615827"/>
-            <a:ext cx="3471542" cy="1169551"/>
+            <a:off x="7916464" y="1776275"/>
+            <a:ext cx="3692908" cy="1600438"/>
           </a:xfrm>
           <a:prstGeom prst="rect">
             <a:avLst/>
@@ -4561,38 +4398,25 @@
           <a:lstStyle/>
           <a:p>
             <a:r>
-              <a:rPr lang="en-US" sz="1400" dirty="0"/>
-              <a:t>Open-source image processing toolkit with lots of useful functionality in one place.</a:t>
-            </a:r>
-          </a:p>
-          <a:p>
-            <a:r>
-              <a:rPr lang="en-US" sz="1400" dirty="0"/>
-              <a:t>Started out as a SciPy toolkit (= ‘</a:t>
-            </a:r>
-            <a:r>
-              <a:rPr lang="en-US" sz="1400" dirty="0" err="1"/>
-              <a:t>scikit</a:t>
-            </a:r>
-            <a:r>
-              <a:rPr lang="en-US" sz="1400" dirty="0"/>
-              <a:t>’) in 2009. </a:t>
-            </a:r>
-            <a:r>
-              <a:rPr lang="en-US" sz="1400" i="1" dirty="0"/>
-              <a:t>Works very well with NumPy and SciPy.</a:t>
-            </a:r>
-          </a:p>
-          <a:p>
-            <a:r>
               <a:rPr lang="en-US" sz="1400" dirty="0">
-                <a:hlinkClick r:id="rId5"/>
+                <a:hlinkClick r:id="rId4"/>
               </a:rPr>
               <a:t>https://scikit-image.org</a:t>
             </a:r>
+            <a:endParaRPr lang="en-US" sz="1400" dirty="0"/>
+          </a:p>
+          <a:p>
             <a:r>
               <a:rPr lang="en-US" sz="1400" dirty="0"/>
-              <a:t> </a:t>
+              <a:t>Image processing toolkit with lots of useful functionality in one place. Started out as a SciPy toolkit (= ‘scikit’) in 2009. Works very well with NumPy and SciPy. As of 2020 probably the best choice for your image processing needs. Imported as </a:t>
+            </a:r>
+            <a:r>
+              <a:rPr lang="en-US" sz="1400" b="1" dirty="0" err="1"/>
+              <a:t>skimage</a:t>
+            </a:r>
+            <a:r>
+              <a:rPr lang="en-US" sz="1400" dirty="0"/>
+              <a:t>. </a:t>
             </a:r>
           </a:p>
         </p:txBody>
@@ -4612,7 +4436,7 @@
           <p:nvPr/>
         </p:nvPicPr>
         <p:blipFill>
-          <a:blip r:embed="rId6" cstate="print">
+          <a:blip r:embed="rId5" cstate="print">
             <a:extLst>
               <a:ext uri="{28A0092B-C50C-407E-A947-70E740481C1C}">
                 <a14:useLocalDpi xmlns:a14="http://schemas.microsoft.com/office/drawing/2010/main" val="0"/>
@@ -4625,7 +4449,7 @@
         </p:blipFill>
         <p:spPr>
           <a:xfrm>
-            <a:off x="6689406" y="3853309"/>
+            <a:off x="6541632" y="3975850"/>
             <a:ext cx="1693652" cy="2087524"/>
           </a:xfrm>
           <a:prstGeom prst="rect">
@@ -4647,8 +4471,8 @@
         </p:nvSpPr>
         <p:spPr>
           <a:xfrm>
-            <a:off x="8761101" y="3665964"/>
-            <a:ext cx="2700796" cy="2462213"/>
+            <a:off x="8480335" y="4111671"/>
+            <a:ext cx="2700796" cy="1815882"/>
           </a:xfrm>
           <a:prstGeom prst="rect">
             <a:avLst/>
@@ -4662,14 +4486,8 @@
           <a:lstStyle/>
           <a:p>
             <a:r>
-              <a:rPr lang="en-US" sz="1400" dirty="0"/>
-              <a:t>OpenCV (CV for Computer Vision) is a cross-platform library written in C/C++, started by Intel, now developed by the non-profit OpenCV foundation.</a:t>
-            </a:r>
-          </a:p>
-          <a:p>
-            <a:r>
               <a:rPr lang="en-US" sz="1400" dirty="0">
-                <a:hlinkClick r:id="rId7"/>
+                <a:hlinkClick r:id="rId6"/>
               </a:rPr>
               <a:t>https://opencv.org</a:t>
             </a:r>
@@ -4681,7 +4499,7 @@
           <a:p>
             <a:r>
               <a:rPr lang="en-US" sz="1400" dirty="0"/>
-              <a:t>Can be used in Python via </a:t>
+              <a:t>OpenCV (CV for Computer Vision) is a cross-platform library written in C/C++, started by Intel, now developed by the non-profit OpenCV foundation. Can be used in Python with the wrapper package </a:t>
             </a:r>
             <a:r>
               <a:rPr lang="en-US" sz="1400" b="1" dirty="0" err="1"/>
@@ -4693,7 +4511,7 @@
             </a:r>
             <a:r>
               <a:rPr lang="en-US" sz="1400" dirty="0"/>
-              <a:t>. Focused on real-time computer vision with applications such as facial and gesture recognition, object identification…</a:t>
+              <a:t>. </a:t>
             </a:r>
           </a:p>
         </p:txBody>
@@ -4713,7 +4531,7 @@
           <p:nvPr/>
         </p:nvPicPr>
         <p:blipFill>
-          <a:blip r:embed="rId8">
+          <a:blip r:embed="rId7">
             <a:extLst>
               <a:ext uri="{28A0092B-C50C-407E-A947-70E740481C1C}">
                 <a14:useLocalDpi xmlns:a14="http://schemas.microsoft.com/office/drawing/2010/main" val="0"/>
@@ -4726,7 +4544,7 @@
         </p:blipFill>
         <p:spPr>
           <a:xfrm>
-            <a:off x="720427" y="4097072"/>
+            <a:off x="748135" y="4097072"/>
             <a:ext cx="2190476" cy="1600000"/>
           </a:xfrm>
           <a:prstGeom prst="rect">
@@ -4748,7 +4566,7 @@
         </p:nvSpPr>
         <p:spPr>
           <a:xfrm>
-            <a:off x="3034949" y="4097072"/>
+            <a:off x="3062657" y="4097072"/>
             <a:ext cx="3153197" cy="1600438"/>
           </a:xfrm>
           <a:prstGeom prst="rect">
@@ -4763,16 +4581,389 @@
           <a:lstStyle/>
           <a:p>
             <a:r>
+              <a:rPr lang="en-US" sz="1400" dirty="0">
+                <a:hlinkClick r:id="rId8"/>
+              </a:rPr>
+              <a:t>https://python-pillow.org</a:t>
+            </a:r>
+            <a:r>
+              <a:rPr lang="en-US" sz="1400" dirty="0"/>
+              <a:t> </a:t>
+            </a:r>
+          </a:p>
+          <a:p>
+            <a:r>
               <a:rPr lang="en-US" sz="1400" dirty="0"/>
               <a:t>pillow is a fork of the Python Imaging Library (PIL), a project to provide basic imaging processing capabilities in Python. PIL was discontinued in 2011. The package is called ‘pillow’, but in Python it’s used with ‘import PIL’.</a:t>
             </a:r>
           </a:p>
-          <a:p>
+        </p:txBody>
+      </p:sp>
+      <p:sp>
+        <p:nvSpPr>
+          <p:cNvPr id="15" name="TextBox 14">
+            <a:extLst>
+              <a:ext uri="{FF2B5EF4-FFF2-40B4-BE49-F238E27FC236}">
+                <a16:creationId xmlns:a16="http://schemas.microsoft.com/office/drawing/2014/main" id="{0593CA4C-EF80-4BBF-A114-187B91E1504C}"/>
+              </a:ext>
+            </a:extLst>
+          </p:cNvPr>
+          <p:cNvSpPr txBox="1"/>
+          <p:nvPr/>
+        </p:nvSpPr>
+        <p:spPr>
+          <a:xfrm>
+            <a:off x="489074" y="1776275"/>
+            <a:ext cx="3153197" cy="1384995"/>
+          </a:xfrm>
+          <a:prstGeom prst="rect">
+            <a:avLst/>
+          </a:prstGeom>
+          <a:noFill/>
+        </p:spPr>
+        <p:txBody>
+          <a:bodyPr wrap="square" rtlCol="0">
+            <a:spAutoFit/>
+          </a:bodyPr>
+          <a:lstStyle/>
+          <a:p>
+            <a:r>
+              <a:rPr lang="en-US" sz="1400" dirty="0"/>
+              <a:t>(pronounced </a:t>
+            </a:r>
+            <a:r>
+              <a:rPr lang="en-US" sz="1400" i="1" dirty="0"/>
+              <a:t>Num Pie</a:t>
+            </a:r>
+            <a:r>
+              <a:rPr lang="en-US" sz="1400" dirty="0"/>
+              <a:t>) – </a:t>
+            </a:r>
             <a:r>
               <a:rPr lang="en-US" sz="1400" dirty="0">
                 <a:hlinkClick r:id="rId9"/>
               </a:rPr>
-              <a:t>https://python-pillow.org</a:t>
+              <a:t>https://numpy.org</a:t>
+            </a:r>
+            <a:r>
+              <a:rPr lang="en-US" sz="1400" dirty="0"/>
+              <a:t>   </a:t>
+            </a:r>
+          </a:p>
+          <a:p>
+            <a:pPr>
+              <a:spcAft>
+                <a:spcPts val="800"/>
+              </a:spcAft>
+            </a:pPr>
+            <a:r>
+              <a:rPr lang="en-US" sz="1400" dirty="0"/>
+              <a:t>A library for fast manipulation of multidimensional numerical data. The basic type </a:t>
+            </a:r>
+            <a:r>
+              <a:rPr lang="en-US" sz="1400" i="1" dirty="0" err="1"/>
+              <a:t>ndarray</a:t>
+            </a:r>
+            <a:r>
+              <a:rPr lang="en-US" sz="1400" dirty="0"/>
+              <a:t> is a multidimensional array with zero-based indexing.</a:t>
+            </a:r>
+          </a:p>
+        </p:txBody>
+      </p:sp>
+      <p:pic>
+        <p:nvPicPr>
+          <p:cNvPr id="18" name="Picture 17">
+            <a:extLst>
+              <a:ext uri="{FF2B5EF4-FFF2-40B4-BE49-F238E27FC236}">
+                <a16:creationId xmlns:a16="http://schemas.microsoft.com/office/drawing/2014/main" id="{2846AC10-B588-430B-A51F-7883A29ECD9C}"/>
+              </a:ext>
+            </a:extLst>
+          </p:cNvPr>
+          <p:cNvPicPr>
+            <a:picLocks noChangeAspect="1"/>
+          </p:cNvPicPr>
+          <p:nvPr/>
+        </p:nvPicPr>
+        <p:blipFill>
+          <a:blip r:embed="rId10" cstate="print">
+            <a:extLst>
+              <a:ext uri="{28A0092B-C50C-407E-A947-70E740481C1C}">
+                <a14:useLocalDpi xmlns:a14="http://schemas.microsoft.com/office/drawing/2010/main" val="0"/>
+              </a:ext>
+            </a:extLst>
+          </a:blip>
+          <a:stretch>
+            <a:fillRect/>
+          </a:stretch>
+        </p:blipFill>
+        <p:spPr>
+          <a:xfrm>
+            <a:off x="4025317" y="727779"/>
+            <a:ext cx="2277204" cy="904782"/>
+          </a:xfrm>
+          <a:prstGeom prst="rect">
+            <a:avLst/>
+          </a:prstGeom>
+        </p:spPr>
+      </p:pic>
+      <p:sp>
+        <p:nvSpPr>
+          <p:cNvPr id="21" name="TextBox 20">
+            <a:extLst>
+              <a:ext uri="{FF2B5EF4-FFF2-40B4-BE49-F238E27FC236}">
+                <a16:creationId xmlns:a16="http://schemas.microsoft.com/office/drawing/2014/main" id="{CC016E1F-890F-4841-B85B-BA9233D15B68}"/>
+              </a:ext>
+            </a:extLst>
+          </p:cNvPr>
+          <p:cNvSpPr txBox="1"/>
+          <p:nvPr/>
+        </p:nvSpPr>
+        <p:spPr>
+          <a:xfrm>
+            <a:off x="3960655" y="1776275"/>
+            <a:ext cx="3594048" cy="1384995"/>
+          </a:xfrm>
+          <a:prstGeom prst="rect">
+            <a:avLst/>
+          </a:prstGeom>
+          <a:noFill/>
+        </p:spPr>
+        <p:txBody>
+          <a:bodyPr wrap="square" rtlCol="0">
+            <a:spAutoFit/>
+          </a:bodyPr>
+          <a:lstStyle/>
+          <a:p>
+            <a:r>
+              <a:rPr lang="en-US" sz="1400" dirty="0"/>
+              <a:t>(pronounced </a:t>
+            </a:r>
+            <a:r>
+              <a:rPr lang="en-US" sz="1400" i="1" dirty="0"/>
+              <a:t>Sigh Pie</a:t>
+            </a:r>
+            <a:r>
+              <a:rPr lang="en-US" sz="1400" dirty="0"/>
+              <a:t>) – </a:t>
+            </a:r>
+            <a:r>
+              <a:rPr lang="en-US" sz="1400" dirty="0">
+                <a:hlinkClick r:id="rId11"/>
+              </a:rPr>
+              <a:t>https://www.scipy.org</a:t>
+            </a:r>
+            <a:r>
+              <a:rPr lang="en-US" sz="1400" dirty="0"/>
+              <a:t> </a:t>
+            </a:r>
+          </a:p>
+          <a:p>
+            <a:r>
+              <a:rPr lang="en-US" sz="1400" dirty="0"/>
+              <a:t>A scientific computing library (built with NumPy arrays) with various modules for numerical integration, linear algebra, image processing, Fourier transforms, signal processing, statistical functions… </a:t>
+            </a:r>
+          </a:p>
+        </p:txBody>
+      </p:sp>
+      <p:graphicFrame>
+        <p:nvGraphicFramePr>
+          <p:cNvPr id="22" name="Object 21">
+            <a:extLst>
+              <a:ext uri="{FF2B5EF4-FFF2-40B4-BE49-F238E27FC236}">
+                <a16:creationId xmlns:a16="http://schemas.microsoft.com/office/drawing/2014/main" id="{B3A32694-9B9F-412A-AA4E-A1254BF023B1}"/>
+              </a:ext>
+            </a:extLst>
+          </p:cNvPr>
+          <p:cNvGraphicFramePr>
+            <a:graphicFrameLocks noChangeAspect="1"/>
+          </p:cNvGraphicFramePr>
+          <p:nvPr>
+            <p:extLst>
+              <p:ext uri="{D42A27DB-BD31-4B8C-83A1-F6EECF244321}">
+                <p14:modId xmlns:p14="http://schemas.microsoft.com/office/powerpoint/2010/main" val="912050499"/>
+              </p:ext>
+            </p:extLst>
+          </p:nvPr>
+        </p:nvGraphicFramePr>
+        <p:xfrm>
+          <a:off x="515706" y="605487"/>
+          <a:ext cx="2739040" cy="1043444"/>
+        </p:xfrm>
+        <a:graphic>
+          <a:graphicData uri="http://schemas.openxmlformats.org/presentationml/2006/ole">
+            <mc:AlternateContent xmlns:mc="http://schemas.openxmlformats.org/markup-compatibility/2006">
+              <mc:Choice xmlns:v="urn:schemas-microsoft-com:vml" Requires="v">
+                <p:oleObj spid="_x0000_s1036" r:id="rId12" imgW="11301480" imgH="4304520" progId="">
+                  <p:embed/>
+                </p:oleObj>
+              </mc:Choice>
+              <mc:Fallback>
+                <p:oleObj r:id="rId12" imgW="11301480" imgH="4304520" progId="">
+                  <p:embed/>
+                  <p:pic>
+                    <p:nvPicPr>
+                      <p:cNvPr id="5" name="Object 4">
+                        <a:extLst>
+                          <a:ext uri="{FF2B5EF4-FFF2-40B4-BE49-F238E27FC236}">
+                            <a16:creationId xmlns:a16="http://schemas.microsoft.com/office/drawing/2014/main" id="{1567AE30-6857-4FE2-8A11-B2BB8CCBDEB8}"/>
+                          </a:ext>
+                        </a:extLst>
+                      </p:cNvPr>
+                      <p:cNvPicPr/>
+                      <p:nvPr/>
+                    </p:nvPicPr>
+                    <p:blipFill>
+                      <a:blip r:embed="rId13"/>
+                      <a:stretch>
+                        <a:fillRect/>
+                      </a:stretch>
+                    </p:blipFill>
+                    <p:spPr>
+                      <a:xfrm>
+                        <a:off x="515706" y="605487"/>
+                        <a:ext cx="2739040" cy="1043444"/>
+                      </a:xfrm>
+                      <a:prstGeom prst="rect">
+                        <a:avLst/>
+                      </a:prstGeom>
+                    </p:spPr>
+                  </p:pic>
+                </p:oleObj>
+              </mc:Fallback>
+            </mc:AlternateContent>
+          </a:graphicData>
+        </a:graphic>
+      </p:graphicFrame>
+      <p:sp>
+        <p:nvSpPr>
+          <p:cNvPr id="2" name="Rectangle: Rounded Corners 1">
+            <a:extLst>
+              <a:ext uri="{FF2B5EF4-FFF2-40B4-BE49-F238E27FC236}">
+                <a16:creationId xmlns:a16="http://schemas.microsoft.com/office/drawing/2014/main" id="{958E916A-3D7B-45C5-81E9-56AE71CEB8BB}"/>
+              </a:ext>
+            </a:extLst>
+          </p:cNvPr>
+          <p:cNvSpPr/>
+          <p:nvPr/>
+        </p:nvSpPr>
+        <p:spPr>
+          <a:xfrm>
+            <a:off x="7696940" y="488272"/>
+            <a:ext cx="4101483" cy="3169328"/>
+          </a:xfrm>
+          <a:prstGeom prst="roundRect">
+            <a:avLst/>
+          </a:prstGeom>
+          <a:noFill/>
+          <a:ln w="19050">
+            <a:solidFill>
+              <a:srgbClr val="C00000"/>
+            </a:solidFill>
+          </a:ln>
+        </p:spPr>
+        <p:style>
+          <a:lnRef idx="2">
+            <a:schemeClr val="accent1">
+              <a:shade val="50000"/>
+            </a:schemeClr>
+          </a:lnRef>
+          <a:fillRef idx="1">
+            <a:schemeClr val="accent1"/>
+          </a:fillRef>
+          <a:effectRef idx="0">
+            <a:schemeClr val="accent1"/>
+          </a:effectRef>
+          <a:fontRef idx="minor">
+            <a:schemeClr val="lt1"/>
+          </a:fontRef>
+        </p:style>
+        <p:txBody>
+          <a:bodyPr rtlCol="0" anchor="ctr"/>
+          <a:lstStyle/>
+          <a:p>
+            <a:pPr algn="ctr"/>
+            <a:endParaRPr lang="en-US"/>
+          </a:p>
+        </p:txBody>
+      </p:sp>
+      <p:sp>
+        <p:nvSpPr>
+          <p:cNvPr id="3" name="TextBox 2">
+            <a:extLst>
+              <a:ext uri="{FF2B5EF4-FFF2-40B4-BE49-F238E27FC236}">
+                <a16:creationId xmlns:a16="http://schemas.microsoft.com/office/drawing/2014/main" id="{5184E669-1A5E-4031-A192-563EE7C158E2}"/>
+              </a:ext>
+            </a:extLst>
+          </p:cNvPr>
+          <p:cNvSpPr txBox="1"/>
+          <p:nvPr/>
+        </p:nvSpPr>
+        <p:spPr>
+          <a:xfrm>
+            <a:off x="7475138" y="135272"/>
+            <a:ext cx="4498117" cy="307777"/>
+          </a:xfrm>
+          <a:prstGeom prst="rect">
+            <a:avLst/>
+          </a:prstGeom>
+          <a:noFill/>
+        </p:spPr>
+        <p:txBody>
+          <a:bodyPr wrap="square" rtlCol="0">
+            <a:spAutoFit/>
+          </a:bodyPr>
+          <a:lstStyle/>
+          <a:p>
+            <a:pPr algn="ctr"/>
+            <a:r>
+              <a:rPr lang="en-US" sz="1400" dirty="0">
+                <a:solidFill>
+                  <a:srgbClr val="C00000"/>
+                </a:solidFill>
+              </a:rPr>
+              <a:t>Recommended as default choice for most applications</a:t>
+            </a:r>
+          </a:p>
+        </p:txBody>
+      </p:sp>
+      <p:sp>
+        <p:nvSpPr>
+          <p:cNvPr id="4" name="TextBox 3">
+            <a:extLst>
+              <a:ext uri="{FF2B5EF4-FFF2-40B4-BE49-F238E27FC236}">
+                <a16:creationId xmlns:a16="http://schemas.microsoft.com/office/drawing/2014/main" id="{916944D2-CDAD-4FCE-A390-AA1DDF40DF55}"/>
+              </a:ext>
+            </a:extLst>
+          </p:cNvPr>
+          <p:cNvSpPr txBox="1"/>
+          <p:nvPr/>
+        </p:nvSpPr>
+        <p:spPr>
+          <a:xfrm>
+            <a:off x="204187" y="6379439"/>
+            <a:ext cx="11301274" cy="307777"/>
+          </a:xfrm>
+          <a:prstGeom prst="rect">
+            <a:avLst/>
+          </a:prstGeom>
+          <a:noFill/>
+        </p:spPr>
+        <p:txBody>
+          <a:bodyPr wrap="square" rtlCol="0">
+            <a:spAutoFit/>
+          </a:bodyPr>
+          <a:lstStyle/>
+          <a:p>
+            <a:r>
+              <a:rPr lang="en-US" sz="1400" dirty="0"/>
+              <a:t>… and there are more packages to explore: </a:t>
+            </a:r>
+            <a:r>
+              <a:rPr lang="en-US" sz="1400" dirty="0">
+                <a:hlinkClick r:id="rId14"/>
+              </a:rPr>
+              <a:t>https://opensource.com/article/19/3/python-image-manipulation-tools</a:t>
             </a:r>
             <a:r>
               <a:rPr lang="en-US" sz="1400" dirty="0"/>
@@ -4825,7 +5016,7 @@
                                           </p:stCondLst>
                                         </p:cTn>
                                         <p:tgtEl>
-                                          <p:spTgt spid="13"/>
+                                          <p:spTgt spid="18"/>
                                         </p:tgtEl>
                                         <p:attrNameLst>
                                           <p:attrName>style.visibility</p:attrName>
@@ -4852,7 +5043,7 @@
                                           </p:stCondLst>
                                         </p:cTn>
                                         <p:tgtEl>
-                                          <p:spTgt spid="14"/>
+                                          <p:spTgt spid="21"/>
                                         </p:tgtEl>
                                         <p:attrNameLst>
                                           <p:attrName>style.visibility</p:attrName>
@@ -4897,7 +5088,7 @@
                                           </p:stCondLst>
                                         </p:cTn>
                                         <p:tgtEl>
-                                          <p:spTgt spid="19"/>
+                                          <p:spTgt spid="13"/>
                                         </p:tgtEl>
                                         <p:attrNameLst>
                                           <p:attrName>style.visibility</p:attrName>
@@ -4924,7 +5115,7 @@
                                           </p:stCondLst>
                                         </p:cTn>
                                         <p:tgtEl>
-                                          <p:spTgt spid="20"/>
+                                          <p:spTgt spid="14"/>
                                         </p:tgtEl>
                                         <p:attrNameLst>
                                           <p:attrName>style.visibility</p:attrName>
@@ -4969,7 +5160,7 @@
                                           </p:stCondLst>
                                         </p:cTn>
                                         <p:tgtEl>
-                                          <p:spTgt spid="16"/>
+                                          <p:spTgt spid="19"/>
                                         </p:tgtEl>
                                         <p:attrNameLst>
                                           <p:attrName>style.visibility</p:attrName>
@@ -4996,7 +5187,196 @@
                                           </p:stCondLst>
                                         </p:cTn>
                                         <p:tgtEl>
+                                          <p:spTgt spid="20"/>
+                                        </p:tgtEl>
+                                        <p:attrNameLst>
+                                          <p:attrName>style.visibility</p:attrName>
+                                        </p:attrNameLst>
+                                      </p:cBhvr>
+                                      <p:to>
+                                        <p:strVal val="visible"/>
+                                      </p:to>
+                                    </p:set>
+                                  </p:childTnLst>
+                                </p:cTn>
+                              </p:par>
+                            </p:childTnLst>
+                          </p:cTn>
+                        </p:par>
+                      </p:childTnLst>
+                    </p:cTn>
+                  </p:par>
+                  <p:par>
+                    <p:cTn id="21" fill="hold">
+                      <p:stCondLst>
+                        <p:cond delay="indefinite"/>
+                      </p:stCondLst>
+                      <p:childTnLst>
+                        <p:par>
+                          <p:cTn id="22" fill="hold">
+                            <p:stCondLst>
+                              <p:cond delay="0"/>
+                            </p:stCondLst>
+                            <p:childTnLst>
+                              <p:par>
+                                <p:cTn id="23" presetID="1" presetClass="entr" presetSubtype="0" fill="hold" nodeType="clickEffect">
+                                  <p:stCondLst>
+                                    <p:cond delay="0"/>
+                                  </p:stCondLst>
+                                  <p:childTnLst>
+                                    <p:set>
+                                      <p:cBhvr>
+                                        <p:cTn id="24" dur="1" fill="hold">
+                                          <p:stCondLst>
+                                            <p:cond delay="0"/>
+                                          </p:stCondLst>
+                                        </p:cTn>
+                                        <p:tgtEl>
+                                          <p:spTgt spid="16"/>
+                                        </p:tgtEl>
+                                        <p:attrNameLst>
+                                          <p:attrName>style.visibility</p:attrName>
+                                        </p:attrNameLst>
+                                      </p:cBhvr>
+                                      <p:to>
+                                        <p:strVal val="visible"/>
+                                      </p:to>
+                                    </p:set>
+                                  </p:childTnLst>
+                                </p:cTn>
+                              </p:par>
+                              <p:par>
+                                <p:cTn id="25" presetID="1" presetClass="entr" presetSubtype="0" fill="hold" grpId="0" nodeType="withEffect">
+                                  <p:stCondLst>
+                                    <p:cond delay="0"/>
+                                  </p:stCondLst>
+                                  <p:childTnLst>
+                                    <p:set>
+                                      <p:cBhvr>
+                                        <p:cTn id="26" dur="1" fill="hold">
+                                          <p:stCondLst>
+                                            <p:cond delay="0"/>
+                                          </p:stCondLst>
+                                        </p:cTn>
+                                        <p:tgtEl>
                                           <p:spTgt spid="17"/>
+                                        </p:tgtEl>
+                                        <p:attrNameLst>
+                                          <p:attrName>style.visibility</p:attrName>
+                                        </p:attrNameLst>
+                                      </p:cBhvr>
+                                      <p:to>
+                                        <p:strVal val="visible"/>
+                                      </p:to>
+                                    </p:set>
+                                  </p:childTnLst>
+                                </p:cTn>
+                              </p:par>
+                            </p:childTnLst>
+                          </p:cTn>
+                        </p:par>
+                      </p:childTnLst>
+                    </p:cTn>
+                  </p:par>
+                  <p:par>
+                    <p:cTn id="27" fill="hold">
+                      <p:stCondLst>
+                        <p:cond delay="indefinite"/>
+                      </p:stCondLst>
+                      <p:childTnLst>
+                        <p:par>
+                          <p:cTn id="28" fill="hold">
+                            <p:stCondLst>
+                              <p:cond delay="0"/>
+                            </p:stCondLst>
+                            <p:childTnLst>
+                              <p:par>
+                                <p:cTn id="29" presetID="1" presetClass="entr" presetSubtype="0" fill="hold" grpId="0" nodeType="clickEffect">
+                                  <p:stCondLst>
+                                    <p:cond delay="0"/>
+                                  </p:stCondLst>
+                                  <p:childTnLst>
+                                    <p:set>
+                                      <p:cBhvr>
+                                        <p:cTn id="30" dur="1" fill="hold">
+                                          <p:stCondLst>
+                                            <p:cond delay="0"/>
+                                          </p:stCondLst>
+                                        </p:cTn>
+                                        <p:tgtEl>
+                                          <p:spTgt spid="3"/>
+                                        </p:tgtEl>
+                                        <p:attrNameLst>
+                                          <p:attrName>style.visibility</p:attrName>
+                                        </p:attrNameLst>
+                                      </p:cBhvr>
+                                      <p:to>
+                                        <p:strVal val="visible"/>
+                                      </p:to>
+                                    </p:set>
+                                  </p:childTnLst>
+                                </p:cTn>
+                              </p:par>
+                              <p:par>
+                                <p:cTn id="31" presetID="1" presetClass="entr" presetSubtype="0" fill="hold" grpId="0" nodeType="withEffect">
+                                  <p:stCondLst>
+                                    <p:cond delay="0"/>
+                                  </p:stCondLst>
+                                  <p:childTnLst>
+                                    <p:set>
+                                      <p:cBhvr>
+                                        <p:cTn id="32" dur="1" fill="hold">
+                                          <p:stCondLst>
+                                            <p:cond delay="0"/>
+                                          </p:stCondLst>
+                                        </p:cTn>
+                                        <p:tgtEl>
+                                          <p:spTgt spid="2"/>
+                                        </p:tgtEl>
+                                        <p:attrNameLst>
+                                          <p:attrName>style.visibility</p:attrName>
+                                        </p:attrNameLst>
+                                      </p:cBhvr>
+                                      <p:to>
+                                        <p:strVal val="visible"/>
+                                      </p:to>
+                                    </p:set>
+                                  </p:childTnLst>
+                                </p:cTn>
+                              </p:par>
+                            </p:childTnLst>
+                          </p:cTn>
+                        </p:par>
+                      </p:childTnLst>
+                    </p:cTn>
+                  </p:par>
+                  <p:par>
+                    <p:cTn id="33" fill="hold">
+                      <p:stCondLst>
+                        <p:cond delay="indefinite"/>
+                      </p:stCondLst>
+                      <p:childTnLst>
+                        <p:par>
+                          <p:cTn id="34" fill="hold">
+                            <p:stCondLst>
+                              <p:cond delay="0"/>
+                            </p:stCondLst>
+                            <p:childTnLst>
+                              <p:par>
+                                <p:cTn id="35" presetID="1" presetClass="entr" presetSubtype="0" fill="hold" grpId="0" nodeType="clickEffect">
+                                  <p:stCondLst>
+                                    <p:cond delay="0"/>
+                                  </p:stCondLst>
+                                  <p:childTnLst>
+                                    <p:set>
+                                      <p:cBhvr>
+                                        <p:cTn id="36" dur="1" fill="hold">
+                                          <p:stCondLst>
+                                            <p:cond delay="0"/>
+                                          </p:stCondLst>
+                                        </p:cTn>
+                                        <p:tgtEl>
+                                          <p:spTgt spid="4"/>
                                         </p:tgtEl>
                                         <p:attrNameLst>
                                           <p:attrName>style.visibility</p:attrName>
@@ -5040,6 +5420,10 @@
       <p:bldP spid="14" grpId="0"/>
       <p:bldP spid="17" grpId="0"/>
       <p:bldP spid="20" grpId="0"/>
+      <p:bldP spid="21" grpId="0"/>
+      <p:bldP spid="2" grpId="0" animBg="1"/>
+      <p:bldP spid="3" grpId="0"/>
+      <p:bldP spid="4" grpId="0"/>
     </p:bldLst>
   </p:timing>
 </p:sld>
@@ -5080,24 +5464,22 @@
         </p:nvSpPr>
         <p:spPr>
           <a:xfrm>
-            <a:off x="1235149" y="1308173"/>
-            <a:ext cx="9206023" cy="4351338"/>
+            <a:off x="1244386" y="892537"/>
+            <a:ext cx="9206023" cy="5268118"/>
           </a:xfrm>
         </p:spPr>
         <p:txBody>
-          <a:bodyPr/>
+          <a:bodyPr>
+            <a:normAutofit/>
+          </a:bodyPr>
           <a:lstStyle/>
           <a:p>
             <a:pPr marL="0" indent="0">
               <a:buNone/>
             </a:pPr>
             <a:r>
-              <a:rPr lang="en-US" b="1" dirty="0" smtClean="0"/>
-              <a:t>Hands-on examples </a:t>
-            </a:r>
-            <a:r>
               <a:rPr lang="en-US" b="1" dirty="0"/>
-              <a:t>in </a:t>
+              <a:t>Hands-on examples in </a:t>
             </a:r>
             <a:r>
               <a:rPr lang="en-US" b="1" dirty="0" err="1"/>
@@ -5124,6 +5506,38 @@
             </a:r>
           </a:p>
           <a:p>
+            <a:pPr marL="457200" lvl="1" indent="0">
+              <a:buNone/>
+            </a:pPr>
+            <a:r>
+              <a:rPr lang="en-US" sz="2000" dirty="0"/>
+              <a:t>	</a:t>
+            </a:r>
+            <a:r>
+              <a:rPr lang="en-US" sz="2000" dirty="0">
+                <a:latin typeface="Arial Unicode MS" panose="020B0604020202020204" pitchFamily="34" charset="-128"/>
+                <a:ea typeface="Arial Unicode MS" panose="020B0604020202020204" pitchFamily="34" charset="-128"/>
+                <a:cs typeface="Arial Unicode MS" panose="020B0604020202020204" pitchFamily="34" charset="-128"/>
+              </a:rPr>
+              <a:t>→</a:t>
+            </a:r>
+            <a:r>
+              <a:rPr lang="en-US" sz="2000" dirty="0">
+                <a:ea typeface="Arial Unicode MS" panose="020B0604020202020204" pitchFamily="34" charset="-128"/>
+                <a:cs typeface="Arial Unicode MS" panose="020B0604020202020204" pitchFamily="34" charset="-128"/>
+              </a:rPr>
+              <a:t> loading-and-manipulating-</a:t>
+            </a:r>
+            <a:r>
+              <a:rPr lang="en-US" sz="2000" dirty="0" err="1">
+                <a:ea typeface="Arial Unicode MS" panose="020B0604020202020204" pitchFamily="34" charset="-128"/>
+                <a:cs typeface="Arial Unicode MS" panose="020B0604020202020204" pitchFamily="34" charset="-128"/>
+              </a:rPr>
+              <a:t>images.ipynb</a:t>
+            </a:r>
+            <a:endParaRPr lang="en-US" sz="2000" dirty="0"/>
+          </a:p>
+          <a:p>
             <a:pPr marL="514350" indent="-514350">
               <a:buAutoNum type="arabicPeriod"/>
             </a:pPr>
@@ -5133,27 +5547,114 @@
             </a:r>
           </a:p>
           <a:p>
+            <a:pPr marL="457200" lvl="1" indent="0">
+              <a:buNone/>
+            </a:pPr>
+            <a:r>
+              <a:rPr lang="en-US" sz="2000" dirty="0"/>
+              <a:t>	</a:t>
+            </a:r>
+            <a:r>
+              <a:rPr lang="en-US" sz="2000" dirty="0">
+                <a:latin typeface="Arial Unicode MS" panose="020B0604020202020204" pitchFamily="34" charset="-128"/>
+                <a:ea typeface="Arial Unicode MS" panose="020B0604020202020204" pitchFamily="34" charset="-128"/>
+                <a:cs typeface="Arial Unicode MS" panose="020B0604020202020204" pitchFamily="34" charset="-128"/>
+              </a:rPr>
+              <a:t>→</a:t>
+            </a:r>
+            <a:r>
+              <a:rPr lang="en-US" sz="2000" dirty="0">
+                <a:ea typeface="Arial Unicode MS" panose="020B0604020202020204" pitchFamily="34" charset="-128"/>
+                <a:cs typeface="Arial Unicode MS" panose="020B0604020202020204" pitchFamily="34" charset="-128"/>
+              </a:rPr>
+              <a:t> image-</a:t>
+            </a:r>
+            <a:r>
+              <a:rPr lang="en-US" sz="2000" dirty="0" err="1">
+                <a:ea typeface="Arial Unicode MS" panose="020B0604020202020204" pitchFamily="34" charset="-128"/>
+                <a:cs typeface="Arial Unicode MS" panose="020B0604020202020204" pitchFamily="34" charset="-128"/>
+              </a:rPr>
+              <a:t>statistics.ipynb</a:t>
+            </a:r>
+            <a:endParaRPr lang="en-US" sz="2000" dirty="0"/>
+          </a:p>
+          <a:p>
             <a:pPr marL="514350" indent="-514350">
               <a:buAutoNum type="arabicPeriod"/>
             </a:pPr>
             <a:r>
-              <a:rPr lang="en-US" sz="2400" dirty="0" smtClean="0"/>
+              <a:rPr lang="en-US" sz="2400" dirty="0"/>
               <a:t>Applying filters and thresholds</a:t>
             </a:r>
-            <a:endParaRPr lang="en-US" sz="2400" dirty="0"/>
+          </a:p>
+          <a:p>
+            <a:pPr marL="457200" lvl="1" indent="0">
+              <a:buNone/>
+            </a:pPr>
+            <a:r>
+              <a:rPr lang="en-US" sz="2000" dirty="0">
+                <a:latin typeface="Arial Unicode MS" panose="020B0604020202020204" pitchFamily="34" charset="-128"/>
+                <a:ea typeface="Arial Unicode MS" panose="020B0604020202020204" pitchFamily="34" charset="-128"/>
+                <a:cs typeface="Arial Unicode MS" panose="020B0604020202020204" pitchFamily="34" charset="-128"/>
+              </a:rPr>
+              <a:t>	→</a:t>
+            </a:r>
+            <a:r>
+              <a:rPr lang="en-US" sz="2000" dirty="0">
+                <a:ea typeface="Arial Unicode MS" panose="020B0604020202020204" pitchFamily="34" charset="-128"/>
+                <a:cs typeface="Arial Unicode MS" panose="020B0604020202020204" pitchFamily="34" charset="-128"/>
+              </a:rPr>
+              <a:t> filtering-and-</a:t>
+            </a:r>
+            <a:r>
+              <a:rPr lang="en-US" sz="2000" dirty="0" err="1">
+                <a:ea typeface="Arial Unicode MS" panose="020B0604020202020204" pitchFamily="34" charset="-128"/>
+                <a:cs typeface="Arial Unicode MS" panose="020B0604020202020204" pitchFamily="34" charset="-128"/>
+              </a:rPr>
+              <a:t>thresholds.ipynb</a:t>
+            </a:r>
+            <a:endParaRPr lang="en-US" sz="2000" dirty="0"/>
           </a:p>
           <a:p>
             <a:pPr marL="514350" indent="-514350">
               <a:buAutoNum type="arabicPeriod"/>
             </a:pPr>
             <a:r>
-              <a:rPr lang="en-US" sz="2400" dirty="0" smtClean="0"/>
-              <a:t>Blob </a:t>
-            </a:r>
-            <a:r>
               <a:rPr lang="en-US" sz="2400" dirty="0"/>
-              <a:t>detection (count stars in Hubble image)</a:t>
-            </a:r>
+              <a:t>Blob detection (detect objects in Hubble image)</a:t>
+            </a:r>
+          </a:p>
+          <a:p>
+            <a:pPr marL="457200" lvl="1" indent="0">
+              <a:buNone/>
+            </a:pPr>
+            <a:r>
+              <a:rPr lang="en-US" sz="2000" dirty="0"/>
+              <a:t>	</a:t>
+            </a:r>
+            <a:r>
+              <a:rPr lang="en-US" sz="2000" dirty="0">
+                <a:latin typeface="Arial Unicode MS" panose="020B0604020202020204" pitchFamily="34" charset="-128"/>
+                <a:ea typeface="Arial Unicode MS" panose="020B0604020202020204" pitchFamily="34" charset="-128"/>
+                <a:cs typeface="Arial Unicode MS" panose="020B0604020202020204" pitchFamily="34" charset="-128"/>
+              </a:rPr>
+              <a:t>→</a:t>
+            </a:r>
+            <a:r>
+              <a:rPr lang="en-US" sz="2000" dirty="0">
+                <a:ea typeface="Arial Unicode MS" panose="020B0604020202020204" pitchFamily="34" charset="-128"/>
+                <a:cs typeface="Arial Unicode MS" panose="020B0604020202020204" pitchFamily="34" charset="-128"/>
+              </a:rPr>
+              <a:t> blob-</a:t>
+            </a:r>
+            <a:r>
+              <a:rPr lang="en-US" sz="2000" dirty="0" err="1">
+                <a:ea typeface="Arial Unicode MS" panose="020B0604020202020204" pitchFamily="34" charset="-128"/>
+                <a:cs typeface="Arial Unicode MS" panose="020B0604020202020204" pitchFamily="34" charset="-128"/>
+              </a:rPr>
+              <a:t>detection.ipynb</a:t>
+            </a:r>
+            <a:endParaRPr lang="en-US" sz="2000" dirty="0"/>
           </a:p>
           <a:p>
             <a:pPr marL="514350" indent="-514350">
@@ -5161,13 +5662,40 @@
             </a:pPr>
             <a:r>
               <a:rPr lang="en-US" sz="2400" dirty="0"/>
-              <a:t>Segmentation </a:t>
-            </a:r>
-            <a:r>
-              <a:rPr lang="en-US" sz="2400" dirty="0" smtClean="0"/>
-              <a:t>example (nuclear division time series)</a:t>
-            </a:r>
-            <a:endParaRPr lang="en-US" sz="2400" dirty="0"/>
+              <a:t>Segmentation example (nuclear division time series)</a:t>
+            </a:r>
+          </a:p>
+          <a:p>
+            <a:pPr marL="457200" lvl="1" indent="0">
+              <a:buNone/>
+            </a:pPr>
+            <a:r>
+              <a:rPr lang="en-US" sz="2000" dirty="0"/>
+              <a:t>	</a:t>
+            </a:r>
+            <a:r>
+              <a:rPr lang="en-US" sz="2000" dirty="0">
+                <a:latin typeface="Arial Unicode MS" panose="020B0604020202020204" pitchFamily="34" charset="-128"/>
+                <a:ea typeface="Arial Unicode MS" panose="020B0604020202020204" pitchFamily="34" charset="-128"/>
+                <a:cs typeface="Arial Unicode MS" panose="020B0604020202020204" pitchFamily="34" charset="-128"/>
+              </a:rPr>
+              <a:t>→</a:t>
+            </a:r>
+            <a:r>
+              <a:rPr lang="en-US" sz="2000" dirty="0">
+                <a:ea typeface="Arial Unicode MS" panose="020B0604020202020204" pitchFamily="34" charset="-128"/>
+                <a:cs typeface="Arial Unicode MS" panose="020B0604020202020204" pitchFamily="34" charset="-128"/>
+              </a:rPr>
+              <a:t> segmentation-</a:t>
+            </a:r>
+            <a:r>
+              <a:rPr lang="en-US" sz="2000" dirty="0" err="1">
+                <a:ea typeface="Arial Unicode MS" panose="020B0604020202020204" pitchFamily="34" charset="-128"/>
+                <a:cs typeface="Arial Unicode MS" panose="020B0604020202020204" pitchFamily="34" charset="-128"/>
+              </a:rPr>
+              <a:t>example.ipynb</a:t>
+            </a:r>
+            <a:endParaRPr lang="en-US" sz="2000" dirty="0"/>
           </a:p>
           <a:p>
             <a:pPr marL="514350" indent="-514350">
@@ -5187,13 +5715,6 @@
   <p:clrMapOvr>
     <a:masterClrMapping/>
   </p:clrMapOvr>
-  <p:timing>
-    <p:tnLst>
-      <p:par>
-        <p:cTn id="1" dur="indefinite" restart="never" nodeType="tmRoot"/>
-      </p:par>
-    </p:tnLst>
-  </p:timing>
 </p:sld>
 </file>
 

</xml_diff>